<commit_message>
ds aula11 e aula12 GUI
</commit_message>
<xml_diff>
--- a/ds/aula11/MVC-GUI.pptx
+++ b/ds/aula11/MVC-GUI.pptx
@@ -7,9 +7,10 @@
   <p:sldIdLst>
     <p:sldId id="256" r:id="rId2"/>
     <p:sldId id="257" r:id="rId3"/>
-    <p:sldId id="258" r:id="rId4"/>
-    <p:sldId id="259" r:id="rId5"/>
-    <p:sldId id="260" r:id="rId6"/>
+    <p:sldId id="261" r:id="rId4"/>
+    <p:sldId id="258" r:id="rId5"/>
+    <p:sldId id="259" r:id="rId6"/>
+    <p:sldId id="260" r:id="rId7"/>
   </p:sldIdLst>
   <p:sldSz cx="12192000" cy="6858000"/>
   <p:notesSz cx="6858000" cy="9144000"/>
@@ -285,7 +286,7 @@
           <a:p>
             <a:fld id="{0D186B57-1064-47A4-B1EF-85F557C4D45C}" type="datetimeFigureOut">
               <a:rPr lang="pt-BR" smtClean="0"/>
-              <a:t>31/05/2021</a:t>
+              <a:t>02/06/2021</a:t>
             </a:fld>
             <a:endParaRPr lang="pt-BR"/>
           </a:p>
@@ -615,7 +616,7 @@
           <a:p>
             <a:fld id="{0D186B57-1064-47A4-B1EF-85F557C4D45C}" type="datetimeFigureOut">
               <a:rPr lang="pt-BR" smtClean="0"/>
-              <a:t>31/05/2021</a:t>
+              <a:t>02/06/2021</a:t>
             </a:fld>
             <a:endParaRPr lang="pt-BR"/>
           </a:p>
@@ -795,7 +796,7 @@
           <a:p>
             <a:fld id="{0D186B57-1064-47A4-B1EF-85F557C4D45C}" type="datetimeFigureOut">
               <a:rPr lang="pt-BR" smtClean="0"/>
-              <a:t>31/05/2021</a:t>
+              <a:t>02/06/2021</a:t>
             </a:fld>
             <a:endParaRPr lang="pt-BR"/>
           </a:p>
@@ -965,7 +966,7 @@
           <a:p>
             <a:fld id="{0D186B57-1064-47A4-B1EF-85F557C4D45C}" type="datetimeFigureOut">
               <a:rPr lang="pt-BR" smtClean="0"/>
-              <a:t>31/05/2021</a:t>
+              <a:t>02/06/2021</a:t>
             </a:fld>
             <a:endParaRPr lang="pt-BR"/>
           </a:p>
@@ -1242,7 +1243,7 @@
           <a:p>
             <a:fld id="{0D186B57-1064-47A4-B1EF-85F557C4D45C}" type="datetimeFigureOut">
               <a:rPr lang="pt-BR" smtClean="0"/>
-              <a:t>31/05/2021</a:t>
+              <a:t>02/06/2021</a:t>
             </a:fld>
             <a:endParaRPr lang="pt-BR"/>
           </a:p>
@@ -1636,7 +1637,7 @@
           <a:p>
             <a:fld id="{0D186B57-1064-47A4-B1EF-85F557C4D45C}" type="datetimeFigureOut">
               <a:rPr lang="pt-BR" smtClean="0"/>
-              <a:t>31/05/2021</a:t>
+              <a:t>02/06/2021</a:t>
             </a:fld>
             <a:endParaRPr lang="pt-BR"/>
           </a:p>
@@ -2113,7 +2114,7 @@
           <a:p>
             <a:fld id="{0D186B57-1064-47A4-B1EF-85F557C4D45C}" type="datetimeFigureOut">
               <a:rPr lang="pt-BR" smtClean="0"/>
-              <a:t>31/05/2021</a:t>
+              <a:t>02/06/2021</a:t>
             </a:fld>
             <a:endParaRPr lang="pt-BR"/>
           </a:p>
@@ -2231,7 +2232,7 @@
           <a:p>
             <a:fld id="{0D186B57-1064-47A4-B1EF-85F557C4D45C}" type="datetimeFigureOut">
               <a:rPr lang="pt-BR" smtClean="0"/>
-              <a:t>31/05/2021</a:t>
+              <a:t>02/06/2021</a:t>
             </a:fld>
             <a:endParaRPr lang="pt-BR"/>
           </a:p>
@@ -2326,7 +2327,7 @@
           <a:p>
             <a:fld id="{0D186B57-1064-47A4-B1EF-85F557C4D45C}" type="datetimeFigureOut">
               <a:rPr lang="pt-BR" smtClean="0"/>
-              <a:t>31/05/2021</a:t>
+              <a:t>02/06/2021</a:t>
             </a:fld>
             <a:endParaRPr lang="pt-BR"/>
           </a:p>
@@ -2672,7 +2673,7 @@
           <a:p>
             <a:fld id="{0D186B57-1064-47A4-B1EF-85F557C4D45C}" type="datetimeFigureOut">
               <a:rPr lang="pt-BR" smtClean="0"/>
-              <a:t>31/05/2021</a:t>
+              <a:t>02/06/2021</a:t>
             </a:fld>
             <a:endParaRPr lang="pt-BR"/>
           </a:p>
@@ -3060,7 +3061,7 @@
           <a:p>
             <a:fld id="{0D186B57-1064-47A4-B1EF-85F557C4D45C}" type="datetimeFigureOut">
               <a:rPr lang="pt-BR" smtClean="0"/>
-              <a:t>31/05/2021</a:t>
+              <a:t>02/06/2021</a:t>
             </a:fld>
             <a:endParaRPr lang="pt-BR"/>
           </a:p>
@@ -3338,7 +3339,7 @@
           <a:p>
             <a:fld id="{0D186B57-1064-47A4-B1EF-85F557C4D45C}" type="datetimeFigureOut">
               <a:rPr lang="pt-BR" smtClean="0"/>
-              <a:t>31/05/2021</a:t>
+              <a:t>02/06/2021</a:t>
             </a:fld>
             <a:endParaRPr lang="pt-BR"/>
           </a:p>
@@ -4073,7 +4074,7 @@
           <a:p>
             <a:r>
               <a:rPr lang="pt-BR" dirty="0" smtClean="0"/>
-              <a:t>Telas do sistema GUI</a:t>
+              <a:t>Diagrama de casos de uso (DCU)</a:t>
             </a:r>
             <a:endParaRPr lang="pt-BR" dirty="0"/>
           </a:p>
@@ -4081,7 +4082,7 @@
       </p:sp>
       <p:pic>
         <p:nvPicPr>
-          <p:cNvPr id="4" name="Espaço Reservado para Conteúdo 3"/>
+          <p:cNvPr id="7" name="Espaço Reservado para Conteúdo 6"/>
           <p:cNvPicPr>
             <a:picLocks noGrp="1" noChangeAspect="1"/>
           </p:cNvPicPr>
@@ -4097,8 +4098,8 @@
         </p:blipFill>
         <p:spPr>
           <a:xfrm>
-            <a:off x="2616505" y="1521369"/>
-            <a:ext cx="7111390" cy="5110662"/>
+            <a:off x="2957506" y="2358527"/>
+            <a:ext cx="6429388" cy="3810920"/>
           </a:xfrm>
           <a:prstGeom prst="rect">
             <a:avLst/>
@@ -4108,7 +4109,7 @@
     </p:spTree>
     <p:extLst>
       <p:ext uri="{BB962C8B-B14F-4D97-AF65-F5344CB8AC3E}">
-        <p14:creationId xmlns:p14="http://schemas.microsoft.com/office/powerpoint/2010/main" val="824821107"/>
+        <p14:creationId xmlns:p14="http://schemas.microsoft.com/office/powerpoint/2010/main" val="2219906394"/>
       </p:ext>
     </p:extLst>
   </p:cSld>
@@ -4151,6 +4152,85 @@
           <a:lstStyle/>
           <a:p>
             <a:r>
+              <a:rPr lang="pt-BR" dirty="0" smtClean="0"/>
+              <a:t>Telas do sistema GUI</a:t>
+            </a:r>
+            <a:endParaRPr lang="pt-BR" dirty="0"/>
+          </a:p>
+        </p:txBody>
+      </p:sp>
+      <p:pic>
+        <p:nvPicPr>
+          <p:cNvPr id="4" name="Espaço Reservado para Conteúdo 3"/>
+          <p:cNvPicPr>
+            <a:picLocks noGrp="1" noChangeAspect="1"/>
+          </p:cNvPicPr>
+          <p:nvPr>
+            <p:ph idx="1"/>
+          </p:nvPr>
+        </p:nvPicPr>
+        <p:blipFill>
+          <a:blip r:embed="rId2"/>
+          <a:stretch>
+            <a:fillRect/>
+          </a:stretch>
+        </p:blipFill>
+        <p:spPr>
+          <a:xfrm>
+            <a:off x="2616505" y="1521369"/>
+            <a:ext cx="7111390" cy="5110662"/>
+          </a:xfrm>
+          <a:prstGeom prst="rect">
+            <a:avLst/>
+          </a:prstGeom>
+        </p:spPr>
+      </p:pic>
+    </p:spTree>
+    <p:extLst>
+      <p:ext uri="{BB962C8B-B14F-4D97-AF65-F5344CB8AC3E}">
+        <p14:creationId xmlns:p14="http://schemas.microsoft.com/office/powerpoint/2010/main" val="824821107"/>
+      </p:ext>
+    </p:extLst>
+  </p:cSld>
+  <p:clrMapOvr>
+    <a:masterClrMapping/>
+  </p:clrMapOvr>
+</p:sld>
+</file>
+
+<file path=ppt/slides/slide5.xml><?xml version="1.0" encoding="utf-8"?>
+<p:sld xmlns:a="http://schemas.openxmlformats.org/drawingml/2006/main" xmlns:r="http://schemas.openxmlformats.org/officeDocument/2006/relationships" xmlns:p="http://schemas.openxmlformats.org/presentationml/2006/main">
+  <p:cSld>
+    <p:spTree>
+      <p:nvGrpSpPr>
+        <p:cNvPr id="1" name=""/>
+        <p:cNvGrpSpPr/>
+        <p:nvPr/>
+      </p:nvGrpSpPr>
+      <p:grpSpPr>
+        <a:xfrm>
+          <a:off x="0" y="0"/>
+          <a:ext cx="0" cy="0"/>
+          <a:chOff x="0" y="0"/>
+          <a:chExt cx="0" cy="0"/>
+        </a:xfrm>
+      </p:grpSpPr>
+      <p:sp>
+        <p:nvSpPr>
+          <p:cNvPr id="2" name="Título 1"/>
+          <p:cNvSpPr>
+            <a:spLocks noGrp="1"/>
+          </p:cNvSpPr>
+          <p:nvPr>
+            <p:ph type="title"/>
+          </p:nvPr>
+        </p:nvSpPr>
+        <p:spPr/>
+        <p:txBody>
+          <a:bodyPr/>
+          <a:lstStyle/>
+          <a:p>
+            <a:r>
               <a:rPr lang="pt-BR" dirty="0"/>
               <a:t>Telas do sistema GUI</a:t>
             </a:r>
@@ -4220,7 +4300,7 @@
 </p:sld>
 </file>
 
-<file path=ppt/slides/slide5.xml><?xml version="1.0" encoding="utf-8"?>
+<file path=ppt/slides/slide6.xml><?xml version="1.0" encoding="utf-8"?>
 <p:sld xmlns:a="http://schemas.openxmlformats.org/drawingml/2006/main" xmlns:r="http://schemas.openxmlformats.org/officeDocument/2006/relationships" xmlns:p="http://schemas.openxmlformats.org/presentationml/2006/main">
   <p:cSld>
     <p:spTree>

</xml_diff>